<commit_message>
11th botany TM U02 Q&A added
</commit_message>
<xml_diff>
--- a/neet/tamil_biology/files/11th_Bio_Botany_Tamil_U02.pptx
+++ b/neet/tamil_biology/files/11th_Bio_Botany_Tamil_U02.pptx
@@ -3259,8 +3259,8 @@
         </p:nvSpPr>
         <p:spPr>
           <a:xfrm>
-            <a:off x="0" y="91440"/>
-            <a:ext cx="9144000" cy="548640"/>
+            <a:off x="0" y="274320"/>
+            <a:ext cx="9144000" cy="731520"/>
           </a:xfrm>
           <a:prstGeom prst="rect">
             <a:avLst/>
@@ -3307,7 +3307,7 @@
         </p:nvSpPr>
         <p:spPr>
           <a:xfrm>
-            <a:off x="457200" y="457200"/>
+            <a:off x="457200" y="1005840"/>
             <a:ext cx="7315200" cy="3657600"/>
           </a:xfrm>
           <a:prstGeom prst="rect">
@@ -3439,8 +3439,8 @@
         </p:nvSpPr>
         <p:spPr>
           <a:xfrm>
-            <a:off x="0" y="91440"/>
-            <a:ext cx="9144000" cy="548640"/>
+            <a:off x="0" y="274320"/>
+            <a:ext cx="9144000" cy="731520"/>
           </a:xfrm>
           <a:prstGeom prst="rect">
             <a:avLst/>
@@ -3487,7 +3487,7 @@
         </p:nvSpPr>
         <p:spPr>
           <a:xfrm>
-            <a:off x="457200" y="457200"/>
+            <a:off x="457200" y="1005840"/>
             <a:ext cx="7315200" cy="3657600"/>
           </a:xfrm>
           <a:prstGeom prst="rect">
@@ -3603,8 +3603,8 @@
         </p:nvSpPr>
         <p:spPr>
           <a:xfrm>
-            <a:off x="0" y="91440"/>
-            <a:ext cx="9144000" cy="548640"/>
+            <a:off x="0" y="274320"/>
+            <a:ext cx="9144000" cy="731520"/>
           </a:xfrm>
           <a:prstGeom prst="rect">
             <a:avLst/>
@@ -3651,7 +3651,7 @@
         </p:nvSpPr>
         <p:spPr>
           <a:xfrm>
-            <a:off x="457200" y="457200"/>
+            <a:off x="457200" y="1005840"/>
             <a:ext cx="7315200" cy="3657600"/>
           </a:xfrm>
           <a:prstGeom prst="rect">
@@ -3783,8 +3783,8 @@
         </p:nvSpPr>
         <p:spPr>
           <a:xfrm>
-            <a:off x="0" y="91440"/>
-            <a:ext cx="9144000" cy="548640"/>
+            <a:off x="0" y="274320"/>
+            <a:ext cx="9144000" cy="731520"/>
           </a:xfrm>
           <a:prstGeom prst="rect">
             <a:avLst/>
@@ -3831,7 +3831,7 @@
         </p:nvSpPr>
         <p:spPr>
           <a:xfrm>
-            <a:off x="457200" y="457200"/>
+            <a:off x="457200" y="1005840"/>
             <a:ext cx="7315200" cy="3657600"/>
           </a:xfrm>
           <a:prstGeom prst="rect">
@@ -3947,8 +3947,8 @@
         </p:nvSpPr>
         <p:spPr>
           <a:xfrm>
-            <a:off x="0" y="91440"/>
-            <a:ext cx="9144000" cy="548640"/>
+            <a:off x="0" y="274320"/>
+            <a:ext cx="9144000" cy="731520"/>
           </a:xfrm>
           <a:prstGeom prst="rect">
             <a:avLst/>
@@ -3995,7 +3995,7 @@
         </p:nvSpPr>
         <p:spPr>
           <a:xfrm>
-            <a:off x="457200" y="457200"/>
+            <a:off x="457200" y="1005840"/>
             <a:ext cx="7315200" cy="3657600"/>
           </a:xfrm>
           <a:prstGeom prst="rect">
@@ -4127,8 +4127,8 @@
         </p:nvSpPr>
         <p:spPr>
           <a:xfrm>
-            <a:off x="0" y="91440"/>
-            <a:ext cx="9144000" cy="548640"/>
+            <a:off x="0" y="274320"/>
+            <a:ext cx="9144000" cy="731520"/>
           </a:xfrm>
           <a:prstGeom prst="rect">
             <a:avLst/>
@@ -4175,7 +4175,7 @@
         </p:nvSpPr>
         <p:spPr>
           <a:xfrm>
-            <a:off x="457200" y="457200"/>
+            <a:off x="457200" y="1005840"/>
             <a:ext cx="7315200" cy="3657600"/>
           </a:xfrm>
           <a:prstGeom prst="rect">
@@ -4291,8 +4291,8 @@
         </p:nvSpPr>
         <p:spPr>
           <a:xfrm>
-            <a:off x="0" y="91440"/>
-            <a:ext cx="9144000" cy="548640"/>
+            <a:off x="0" y="274320"/>
+            <a:ext cx="9144000" cy="731520"/>
           </a:xfrm>
           <a:prstGeom prst="rect">
             <a:avLst/>
@@ -4339,7 +4339,7 @@
         </p:nvSpPr>
         <p:spPr>
           <a:xfrm>
-            <a:off x="457200" y="457200"/>
+            <a:off x="457200" y="1005840"/>
             <a:ext cx="7315200" cy="3657600"/>
           </a:xfrm>
           <a:prstGeom prst="rect">
@@ -4471,8 +4471,8 @@
         </p:nvSpPr>
         <p:spPr>
           <a:xfrm>
-            <a:off x="0" y="91440"/>
-            <a:ext cx="9144000" cy="548640"/>
+            <a:off x="0" y="274320"/>
+            <a:ext cx="9144000" cy="731520"/>
           </a:xfrm>
           <a:prstGeom prst="rect">
             <a:avLst/>
@@ -4519,7 +4519,7 @@
         </p:nvSpPr>
         <p:spPr>
           <a:xfrm>
-            <a:off x="457200" y="457200"/>
+            <a:off x="457200" y="1005840"/>
             <a:ext cx="7315200" cy="3657600"/>
           </a:xfrm>
           <a:prstGeom prst="rect">
@@ -4635,8 +4635,8 @@
         </p:nvSpPr>
         <p:spPr>
           <a:xfrm>
-            <a:off x="0" y="91440"/>
-            <a:ext cx="9144000" cy="548640"/>
+            <a:off x="0" y="274320"/>
+            <a:ext cx="9144000" cy="731520"/>
           </a:xfrm>
           <a:prstGeom prst="rect">
             <a:avLst/>
@@ -4683,7 +4683,7 @@
         </p:nvSpPr>
         <p:spPr>
           <a:xfrm>
-            <a:off x="457200" y="457200"/>
+            <a:off x="457200" y="1005840"/>
             <a:ext cx="7315200" cy="3657600"/>
           </a:xfrm>
           <a:prstGeom prst="rect">
@@ -4815,8 +4815,8 @@
         </p:nvSpPr>
         <p:spPr>
           <a:xfrm>
-            <a:off x="0" y="91440"/>
-            <a:ext cx="9144000" cy="548640"/>
+            <a:off x="0" y="274320"/>
+            <a:ext cx="9144000" cy="731520"/>
           </a:xfrm>
           <a:prstGeom prst="rect">
             <a:avLst/>
@@ -4863,7 +4863,7 @@
         </p:nvSpPr>
         <p:spPr>
           <a:xfrm>
-            <a:off x="457200" y="457200"/>
+            <a:off x="457200" y="1005840"/>
             <a:ext cx="7315200" cy="3657600"/>
           </a:xfrm>
           <a:prstGeom prst="rect">
@@ -4979,8 +4979,8 @@
         </p:nvSpPr>
         <p:spPr>
           <a:xfrm>
-            <a:off x="0" y="91440"/>
-            <a:ext cx="9144000" cy="548640"/>
+            <a:off x="0" y="274320"/>
+            <a:ext cx="9144000" cy="731520"/>
           </a:xfrm>
           <a:prstGeom prst="rect">
             <a:avLst/>
@@ -5027,7 +5027,7 @@
         </p:nvSpPr>
         <p:spPr>
           <a:xfrm>
-            <a:off x="457200" y="457200"/>
+            <a:off x="457200" y="1005840"/>
             <a:ext cx="7315200" cy="3657600"/>
           </a:xfrm>
           <a:prstGeom prst="rect">
@@ -5159,8 +5159,8 @@
         </p:nvSpPr>
         <p:spPr>
           <a:xfrm>
-            <a:off x="0" y="91440"/>
-            <a:ext cx="9144000" cy="548640"/>
+            <a:off x="0" y="274320"/>
+            <a:ext cx="9144000" cy="731520"/>
           </a:xfrm>
           <a:prstGeom prst="rect">
             <a:avLst/>
@@ -5207,7 +5207,7 @@
         </p:nvSpPr>
         <p:spPr>
           <a:xfrm>
-            <a:off x="457200" y="457200"/>
+            <a:off x="457200" y="1005840"/>
             <a:ext cx="7315200" cy="3657600"/>
           </a:xfrm>
           <a:prstGeom prst="rect">
@@ -5339,8 +5339,8 @@
         </p:nvSpPr>
         <p:spPr>
           <a:xfrm>
-            <a:off x="0" y="91440"/>
-            <a:ext cx="9144000" cy="548640"/>
+            <a:off x="0" y="274320"/>
+            <a:ext cx="9144000" cy="731520"/>
           </a:xfrm>
           <a:prstGeom prst="rect">
             <a:avLst/>
@@ -5387,7 +5387,7 @@
         </p:nvSpPr>
         <p:spPr>
           <a:xfrm>
-            <a:off x="457200" y="457200"/>
+            <a:off x="457200" y="1005840"/>
             <a:ext cx="7315200" cy="3657600"/>
           </a:xfrm>
           <a:prstGeom prst="rect">
@@ -5503,8 +5503,8 @@
         </p:nvSpPr>
         <p:spPr>
           <a:xfrm>
-            <a:off x="0" y="91440"/>
-            <a:ext cx="9144000" cy="548640"/>
+            <a:off x="0" y="274320"/>
+            <a:ext cx="9144000" cy="731520"/>
           </a:xfrm>
           <a:prstGeom prst="rect">
             <a:avLst/>
@@ -5551,7 +5551,7 @@
         </p:nvSpPr>
         <p:spPr>
           <a:xfrm>
-            <a:off x="457200" y="457200"/>
+            <a:off x="457200" y="1005840"/>
             <a:ext cx="7315200" cy="3657600"/>
           </a:xfrm>
           <a:prstGeom prst="rect">
@@ -5683,8 +5683,8 @@
         </p:nvSpPr>
         <p:spPr>
           <a:xfrm>
-            <a:off x="0" y="91440"/>
-            <a:ext cx="9144000" cy="548640"/>
+            <a:off x="0" y="274320"/>
+            <a:ext cx="9144000" cy="731520"/>
           </a:xfrm>
           <a:prstGeom prst="rect">
             <a:avLst/>
@@ -5731,7 +5731,7 @@
         </p:nvSpPr>
         <p:spPr>
           <a:xfrm>
-            <a:off x="457200" y="457200"/>
+            <a:off x="457200" y="1005840"/>
             <a:ext cx="7315200" cy="3657600"/>
           </a:xfrm>
           <a:prstGeom prst="rect">
@@ -5847,8 +5847,8 @@
         </p:nvSpPr>
         <p:spPr>
           <a:xfrm>
-            <a:off x="0" y="91440"/>
-            <a:ext cx="9144000" cy="548640"/>
+            <a:off x="0" y="274320"/>
+            <a:ext cx="9144000" cy="731520"/>
           </a:xfrm>
           <a:prstGeom prst="rect">
             <a:avLst/>
@@ -5895,7 +5895,7 @@
         </p:nvSpPr>
         <p:spPr>
           <a:xfrm>
-            <a:off x="457200" y="457200"/>
+            <a:off x="457200" y="1005840"/>
             <a:ext cx="7315200" cy="3657600"/>
           </a:xfrm>
           <a:prstGeom prst="rect">
@@ -6027,8 +6027,8 @@
         </p:nvSpPr>
         <p:spPr>
           <a:xfrm>
-            <a:off x="0" y="91440"/>
-            <a:ext cx="9144000" cy="548640"/>
+            <a:off x="0" y="274320"/>
+            <a:ext cx="9144000" cy="731520"/>
           </a:xfrm>
           <a:prstGeom prst="rect">
             <a:avLst/>
@@ -6075,7 +6075,7 @@
         </p:nvSpPr>
         <p:spPr>
           <a:xfrm>
-            <a:off x="457200" y="457200"/>
+            <a:off x="457200" y="1005840"/>
             <a:ext cx="7315200" cy="3657600"/>
           </a:xfrm>
           <a:prstGeom prst="rect">
@@ -6191,8 +6191,8 @@
         </p:nvSpPr>
         <p:spPr>
           <a:xfrm>
-            <a:off x="0" y="91440"/>
-            <a:ext cx="9144000" cy="548640"/>
+            <a:off x="0" y="274320"/>
+            <a:ext cx="9144000" cy="731520"/>
           </a:xfrm>
           <a:prstGeom prst="rect">
             <a:avLst/>
@@ -6239,7 +6239,7 @@
         </p:nvSpPr>
         <p:spPr>
           <a:xfrm>
-            <a:off x="457200" y="457200"/>
+            <a:off x="457200" y="1005840"/>
             <a:ext cx="7315200" cy="3657600"/>
           </a:xfrm>
           <a:prstGeom prst="rect">
@@ -6363,8 +6363,8 @@
         </p:nvSpPr>
         <p:spPr>
           <a:xfrm>
-            <a:off x="0" y="91440"/>
-            <a:ext cx="9144000" cy="548640"/>
+            <a:off x="0" y="274320"/>
+            <a:ext cx="9144000" cy="731520"/>
           </a:xfrm>
           <a:prstGeom prst="rect">
             <a:avLst/>
@@ -6411,7 +6411,7 @@
         </p:nvSpPr>
         <p:spPr>
           <a:xfrm>
-            <a:off x="457200" y="457200"/>
+            <a:off x="457200" y="1005840"/>
             <a:ext cx="7315200" cy="3657600"/>
           </a:xfrm>
           <a:prstGeom prst="rect">
@@ -6519,8 +6519,8 @@
         </p:nvSpPr>
         <p:spPr>
           <a:xfrm>
-            <a:off x="0" y="91440"/>
-            <a:ext cx="9144000" cy="548640"/>
+            <a:off x="0" y="274320"/>
+            <a:ext cx="9144000" cy="731520"/>
           </a:xfrm>
           <a:prstGeom prst="rect">
             <a:avLst/>
@@ -6567,7 +6567,7 @@
         </p:nvSpPr>
         <p:spPr>
           <a:xfrm>
-            <a:off x="457200" y="457200"/>
+            <a:off x="457200" y="1005840"/>
             <a:ext cx="7315200" cy="3657600"/>
           </a:xfrm>
           <a:prstGeom prst="rect">
@@ -6699,8 +6699,8 @@
         </p:nvSpPr>
         <p:spPr>
           <a:xfrm>
-            <a:off x="0" y="91440"/>
-            <a:ext cx="9144000" cy="548640"/>
+            <a:off x="0" y="274320"/>
+            <a:ext cx="9144000" cy="731520"/>
           </a:xfrm>
           <a:prstGeom prst="rect">
             <a:avLst/>
@@ -6747,7 +6747,7 @@
         </p:nvSpPr>
         <p:spPr>
           <a:xfrm>
-            <a:off x="457200" y="457200"/>
+            <a:off x="457200" y="1005840"/>
             <a:ext cx="7315200" cy="3657600"/>
           </a:xfrm>
           <a:prstGeom prst="rect">
@@ -6863,8 +6863,8 @@
         </p:nvSpPr>
         <p:spPr>
           <a:xfrm>
-            <a:off x="0" y="91440"/>
-            <a:ext cx="9144000" cy="548640"/>
+            <a:off x="0" y="274320"/>
+            <a:ext cx="9144000" cy="731520"/>
           </a:xfrm>
           <a:prstGeom prst="rect">
             <a:avLst/>
@@ -6911,7 +6911,7 @@
         </p:nvSpPr>
         <p:spPr>
           <a:xfrm>
-            <a:off x="457200" y="457200"/>
+            <a:off x="457200" y="1005840"/>
             <a:ext cx="7315200" cy="3657600"/>
           </a:xfrm>
           <a:prstGeom prst="rect">
@@ -7027,8 +7027,8 @@
         </p:nvSpPr>
         <p:spPr>
           <a:xfrm>
-            <a:off x="0" y="91440"/>
-            <a:ext cx="9144000" cy="548640"/>
+            <a:off x="0" y="274320"/>
+            <a:ext cx="9144000" cy="731520"/>
           </a:xfrm>
           <a:prstGeom prst="rect">
             <a:avLst/>
@@ -7075,7 +7075,7 @@
         </p:nvSpPr>
         <p:spPr>
           <a:xfrm>
-            <a:off x="457200" y="457200"/>
+            <a:off x="457200" y="1005840"/>
             <a:ext cx="7315200" cy="3657600"/>
           </a:xfrm>
           <a:prstGeom prst="rect">
@@ -7219,8 +7219,8 @@
         </p:nvSpPr>
         <p:spPr>
           <a:xfrm>
-            <a:off x="0" y="91440"/>
-            <a:ext cx="9144000" cy="548640"/>
+            <a:off x="0" y="274320"/>
+            <a:ext cx="9144000" cy="731520"/>
           </a:xfrm>
           <a:prstGeom prst="rect">
             <a:avLst/>
@@ -7267,7 +7267,7 @@
         </p:nvSpPr>
         <p:spPr>
           <a:xfrm>
-            <a:off x="457200" y="457200"/>
+            <a:off x="457200" y="1005840"/>
             <a:ext cx="7315200" cy="3657600"/>
           </a:xfrm>
           <a:prstGeom prst="rect">
@@ -7395,8 +7395,8 @@
         </p:nvSpPr>
         <p:spPr>
           <a:xfrm>
-            <a:off x="0" y="91440"/>
-            <a:ext cx="9144000" cy="548640"/>
+            <a:off x="0" y="274320"/>
+            <a:ext cx="9144000" cy="731520"/>
           </a:xfrm>
           <a:prstGeom prst="rect">
             <a:avLst/>
@@ -7443,7 +7443,7 @@
         </p:nvSpPr>
         <p:spPr>
           <a:xfrm>
-            <a:off x="457200" y="457200"/>
+            <a:off x="457200" y="1005840"/>
             <a:ext cx="7315200" cy="3657600"/>
           </a:xfrm>
           <a:prstGeom prst="rect">
@@ -7575,8 +7575,8 @@
         </p:nvSpPr>
         <p:spPr>
           <a:xfrm>
-            <a:off x="0" y="91440"/>
-            <a:ext cx="9144000" cy="548640"/>
+            <a:off x="0" y="274320"/>
+            <a:ext cx="9144000" cy="731520"/>
           </a:xfrm>
           <a:prstGeom prst="rect">
             <a:avLst/>
@@ -7623,7 +7623,7 @@
         </p:nvSpPr>
         <p:spPr>
           <a:xfrm>
-            <a:off x="457200" y="457200"/>
+            <a:off x="457200" y="1005840"/>
             <a:ext cx="7315200" cy="3657600"/>
           </a:xfrm>
           <a:prstGeom prst="rect">
@@ -7739,8 +7739,8 @@
         </p:nvSpPr>
         <p:spPr>
           <a:xfrm>
-            <a:off x="0" y="91440"/>
-            <a:ext cx="9144000" cy="548640"/>
+            <a:off x="0" y="274320"/>
+            <a:ext cx="9144000" cy="731520"/>
           </a:xfrm>
           <a:prstGeom prst="rect">
             <a:avLst/>
@@ -7787,7 +7787,7 @@
         </p:nvSpPr>
         <p:spPr>
           <a:xfrm>
-            <a:off x="457200" y="457200"/>
+            <a:off x="457200" y="1005840"/>
             <a:ext cx="7315200" cy="3657600"/>
           </a:xfrm>
           <a:prstGeom prst="rect">
@@ -7911,8 +7911,8 @@
         </p:nvSpPr>
         <p:spPr>
           <a:xfrm>
-            <a:off x="0" y="91440"/>
-            <a:ext cx="9144000" cy="548640"/>
+            <a:off x="0" y="274320"/>
+            <a:ext cx="9144000" cy="731520"/>
           </a:xfrm>
           <a:prstGeom prst="rect">
             <a:avLst/>
@@ -7959,7 +7959,7 @@
         </p:nvSpPr>
         <p:spPr>
           <a:xfrm>
-            <a:off x="457200" y="457200"/>
+            <a:off x="457200" y="1005840"/>
             <a:ext cx="7315200" cy="3657600"/>
           </a:xfrm>
           <a:prstGeom prst="rect">
@@ -8067,8 +8067,8 @@
         </p:nvSpPr>
         <p:spPr>
           <a:xfrm>
-            <a:off x="0" y="91440"/>
-            <a:ext cx="9144000" cy="548640"/>
+            <a:off x="0" y="274320"/>
+            <a:ext cx="9144000" cy="731520"/>
           </a:xfrm>
           <a:prstGeom prst="rect">
             <a:avLst/>
@@ -8115,7 +8115,7 @@
         </p:nvSpPr>
         <p:spPr>
           <a:xfrm>
-            <a:off x="457200" y="457200"/>
+            <a:off x="457200" y="1005840"/>
             <a:ext cx="7315200" cy="3657600"/>
           </a:xfrm>
           <a:prstGeom prst="rect">
@@ -8263,8 +8263,8 @@
         </p:nvSpPr>
         <p:spPr>
           <a:xfrm>
-            <a:off x="0" y="91440"/>
-            <a:ext cx="9144000" cy="548640"/>
+            <a:off x="0" y="274320"/>
+            <a:ext cx="9144000" cy="731520"/>
           </a:xfrm>
           <a:prstGeom prst="rect">
             <a:avLst/>
@@ -8311,7 +8311,7 @@
         </p:nvSpPr>
         <p:spPr>
           <a:xfrm>
-            <a:off x="457200" y="457200"/>
+            <a:off x="457200" y="1005840"/>
             <a:ext cx="7315200" cy="3657600"/>
           </a:xfrm>
           <a:prstGeom prst="rect">
@@ -8443,8 +8443,8 @@
         </p:nvSpPr>
         <p:spPr>
           <a:xfrm>
-            <a:off x="0" y="91440"/>
-            <a:ext cx="9144000" cy="548640"/>
+            <a:off x="0" y="274320"/>
+            <a:ext cx="9144000" cy="731520"/>
           </a:xfrm>
           <a:prstGeom prst="rect">
             <a:avLst/>
@@ -8491,7 +8491,7 @@
         </p:nvSpPr>
         <p:spPr>
           <a:xfrm>
-            <a:off x="457200" y="457200"/>
+            <a:off x="457200" y="1005840"/>
             <a:ext cx="7315200" cy="3657600"/>
           </a:xfrm>
           <a:prstGeom prst="rect">
@@ -8615,8 +8615,8 @@
         </p:nvSpPr>
         <p:spPr>
           <a:xfrm>
-            <a:off x="0" y="91440"/>
-            <a:ext cx="9144000" cy="548640"/>
+            <a:off x="0" y="274320"/>
+            <a:ext cx="9144000" cy="731520"/>
           </a:xfrm>
           <a:prstGeom prst="rect">
             <a:avLst/>
@@ -8663,7 +8663,7 @@
         </p:nvSpPr>
         <p:spPr>
           <a:xfrm>
-            <a:off x="457200" y="457200"/>
+            <a:off x="457200" y="1005840"/>
             <a:ext cx="7315200" cy="3657600"/>
           </a:xfrm>
           <a:prstGeom prst="rect">
@@ -8771,8 +8771,8 @@
         </p:nvSpPr>
         <p:spPr>
           <a:xfrm>
-            <a:off x="0" y="91440"/>
-            <a:ext cx="9144000" cy="548640"/>
+            <a:off x="0" y="274320"/>
+            <a:ext cx="9144000" cy="731520"/>
           </a:xfrm>
           <a:prstGeom prst="rect">
             <a:avLst/>
@@ -8819,7 +8819,7 @@
         </p:nvSpPr>
         <p:spPr>
           <a:xfrm>
-            <a:off x="457200" y="457200"/>
+            <a:off x="457200" y="1005840"/>
             <a:ext cx="7315200" cy="3657600"/>
           </a:xfrm>
           <a:prstGeom prst="rect">
@@ -8951,8 +8951,8 @@
         </p:nvSpPr>
         <p:spPr>
           <a:xfrm>
-            <a:off x="0" y="91440"/>
-            <a:ext cx="9144000" cy="548640"/>
+            <a:off x="0" y="274320"/>
+            <a:ext cx="9144000" cy="731520"/>
           </a:xfrm>
           <a:prstGeom prst="rect">
             <a:avLst/>
@@ -8999,7 +8999,7 @@
         </p:nvSpPr>
         <p:spPr>
           <a:xfrm>
-            <a:off x="457200" y="457200"/>
+            <a:off x="457200" y="1005840"/>
             <a:ext cx="7315200" cy="3657600"/>
           </a:xfrm>
           <a:prstGeom prst="rect">
@@ -9131,8 +9131,8 @@
         </p:nvSpPr>
         <p:spPr>
           <a:xfrm>
-            <a:off x="0" y="91440"/>
-            <a:ext cx="9144000" cy="548640"/>
+            <a:off x="0" y="274320"/>
+            <a:ext cx="9144000" cy="731520"/>
           </a:xfrm>
           <a:prstGeom prst="rect">
             <a:avLst/>
@@ -9179,7 +9179,7 @@
         </p:nvSpPr>
         <p:spPr>
           <a:xfrm>
-            <a:off x="457200" y="457200"/>
+            <a:off x="457200" y="1005840"/>
             <a:ext cx="7315200" cy="3657600"/>
           </a:xfrm>
           <a:prstGeom prst="rect">
@@ -9295,8 +9295,8 @@
         </p:nvSpPr>
         <p:spPr>
           <a:xfrm>
-            <a:off x="0" y="91440"/>
-            <a:ext cx="9144000" cy="548640"/>
+            <a:off x="0" y="274320"/>
+            <a:ext cx="9144000" cy="731520"/>
           </a:xfrm>
           <a:prstGeom prst="rect">
             <a:avLst/>
@@ -9343,7 +9343,7 @@
         </p:nvSpPr>
         <p:spPr>
           <a:xfrm>
-            <a:off x="457200" y="457200"/>
+            <a:off x="457200" y="1005840"/>
             <a:ext cx="7315200" cy="3657600"/>
           </a:xfrm>
           <a:prstGeom prst="rect">
@@ -9475,8 +9475,8 @@
         </p:nvSpPr>
         <p:spPr>
           <a:xfrm>
-            <a:off x="0" y="91440"/>
-            <a:ext cx="9144000" cy="548640"/>
+            <a:off x="0" y="274320"/>
+            <a:ext cx="9144000" cy="731520"/>
           </a:xfrm>
           <a:prstGeom prst="rect">
             <a:avLst/>
@@ -9523,7 +9523,7 @@
         </p:nvSpPr>
         <p:spPr>
           <a:xfrm>
-            <a:off x="457200" y="457200"/>
+            <a:off x="457200" y="1005840"/>
             <a:ext cx="7315200" cy="3657600"/>
           </a:xfrm>
           <a:prstGeom prst="rect">
@@ -9639,8 +9639,8 @@
         </p:nvSpPr>
         <p:spPr>
           <a:xfrm>
-            <a:off x="0" y="91440"/>
-            <a:ext cx="9144000" cy="548640"/>
+            <a:off x="0" y="274320"/>
+            <a:ext cx="9144000" cy="731520"/>
           </a:xfrm>
           <a:prstGeom prst="rect">
             <a:avLst/>
@@ -9687,7 +9687,7 @@
         </p:nvSpPr>
         <p:spPr>
           <a:xfrm>
-            <a:off x="457200" y="457200"/>
+            <a:off x="457200" y="1005840"/>
             <a:ext cx="7315200" cy="3657600"/>
           </a:xfrm>
           <a:prstGeom prst="rect">
@@ -9803,8 +9803,8 @@
         </p:nvSpPr>
         <p:spPr>
           <a:xfrm>
-            <a:off x="0" y="91440"/>
-            <a:ext cx="9144000" cy="548640"/>
+            <a:off x="0" y="274320"/>
+            <a:ext cx="9144000" cy="731520"/>
           </a:xfrm>
           <a:prstGeom prst="rect">
             <a:avLst/>
@@ -9851,7 +9851,7 @@
         </p:nvSpPr>
         <p:spPr>
           <a:xfrm>
-            <a:off x="457200" y="457200"/>
+            <a:off x="457200" y="1005840"/>
             <a:ext cx="7315200" cy="3657600"/>
           </a:xfrm>
           <a:prstGeom prst="rect">
@@ -9983,8 +9983,8 @@
         </p:nvSpPr>
         <p:spPr>
           <a:xfrm>
-            <a:off x="0" y="91440"/>
-            <a:ext cx="9144000" cy="548640"/>
+            <a:off x="0" y="274320"/>
+            <a:ext cx="9144000" cy="731520"/>
           </a:xfrm>
           <a:prstGeom prst="rect">
             <a:avLst/>
@@ -10031,7 +10031,7 @@
         </p:nvSpPr>
         <p:spPr>
           <a:xfrm>
-            <a:off x="457200" y="457200"/>
+            <a:off x="457200" y="1005840"/>
             <a:ext cx="7315200" cy="3657600"/>
           </a:xfrm>
           <a:prstGeom prst="rect">
@@ -10147,8 +10147,8 @@
         </p:nvSpPr>
         <p:spPr>
           <a:xfrm>
-            <a:off x="0" y="91440"/>
-            <a:ext cx="9144000" cy="548640"/>
+            <a:off x="0" y="274320"/>
+            <a:ext cx="9144000" cy="731520"/>
           </a:xfrm>
           <a:prstGeom prst="rect">
             <a:avLst/>
@@ -10195,7 +10195,7 @@
         </p:nvSpPr>
         <p:spPr>
           <a:xfrm>
-            <a:off x="457200" y="457200"/>
+            <a:off x="457200" y="1005840"/>
             <a:ext cx="7315200" cy="3657600"/>
           </a:xfrm>
           <a:prstGeom prst="rect">
@@ -10319,8 +10319,8 @@
         </p:nvSpPr>
         <p:spPr>
           <a:xfrm>
-            <a:off x="0" y="91440"/>
-            <a:ext cx="9144000" cy="548640"/>
+            <a:off x="0" y="274320"/>
+            <a:ext cx="9144000" cy="731520"/>
           </a:xfrm>
           <a:prstGeom prst="rect">
             <a:avLst/>
@@ -10367,7 +10367,7 @@
         </p:nvSpPr>
         <p:spPr>
           <a:xfrm>
-            <a:off x="457200" y="457200"/>
+            <a:off x="457200" y="1005840"/>
             <a:ext cx="7315200" cy="3657600"/>
           </a:xfrm>
           <a:prstGeom prst="rect">

</xml_diff>